<commit_message>
modbus done, klima done, temp sun ahead
</commit_message>
<xml_diff>
--- a/docs/abbildungen/20160321_modbustcp.pptx
+++ b/docs/abbildungen/20160321_modbustcp.pptx
@@ -5,10 +5,11 @@
     <p:sldMasterId id="2147483648" r:id="rId1"/>
   </p:sldMasterIdLst>
   <p:handoutMasterIdLst>
-    <p:handoutMasterId r:id="rId3"/>
+    <p:handoutMasterId r:id="rId4"/>
   </p:handoutMasterIdLst>
   <p:sldIdLst>
     <p:sldId id="256" r:id="rId2"/>
+    <p:sldId id="257" r:id="rId3"/>
   </p:sldIdLst>
   <p:sldSz cx="12192000" cy="6858000"/>
   <p:notesSz cx="6858000" cy="9144000"/>
@@ -200,7 +201,7 @@
           <a:p>
             <a:fld id="{5753CF93-5E45-3941-8549-3B143DEE3F14}" type="datetimeFigureOut">
               <a:rPr lang="de-DE" smtClean="0"/>
-              <a:t>21.03.16</a:t>
+              <a:t>22.03.16</a:t>
             </a:fld>
             <a:endParaRPr lang="de-DE"/>
           </a:p>
@@ -414,7 +415,7 @@
           <a:p>
             <a:fld id="{CAD28D52-5B67-8840-9FB3-766E3199C55A}" type="datetimeFigureOut">
               <a:rPr lang="de-DE" smtClean="0"/>
-              <a:t>21.03.16</a:t>
+              <a:t>22.03.16</a:t>
             </a:fld>
             <a:endParaRPr lang="de-DE"/>
           </a:p>
@@ -584,7 +585,7 @@
           <a:p>
             <a:fld id="{CAD28D52-5B67-8840-9FB3-766E3199C55A}" type="datetimeFigureOut">
               <a:rPr lang="de-DE" smtClean="0"/>
-              <a:t>21.03.16</a:t>
+              <a:t>22.03.16</a:t>
             </a:fld>
             <a:endParaRPr lang="de-DE"/>
           </a:p>
@@ -764,7 +765,7 @@
           <a:p>
             <a:fld id="{CAD28D52-5B67-8840-9FB3-766E3199C55A}" type="datetimeFigureOut">
               <a:rPr lang="de-DE" smtClean="0"/>
-              <a:t>21.03.16</a:t>
+              <a:t>22.03.16</a:t>
             </a:fld>
             <a:endParaRPr lang="de-DE"/>
           </a:p>
@@ -934,7 +935,7 @@
           <a:p>
             <a:fld id="{CAD28D52-5B67-8840-9FB3-766E3199C55A}" type="datetimeFigureOut">
               <a:rPr lang="de-DE" smtClean="0"/>
-              <a:t>21.03.16</a:t>
+              <a:t>22.03.16</a:t>
             </a:fld>
             <a:endParaRPr lang="de-DE"/>
           </a:p>
@@ -1180,7 +1181,7 @@
           <a:p>
             <a:fld id="{CAD28D52-5B67-8840-9FB3-766E3199C55A}" type="datetimeFigureOut">
               <a:rPr lang="de-DE" smtClean="0"/>
-              <a:t>21.03.16</a:t>
+              <a:t>22.03.16</a:t>
             </a:fld>
             <a:endParaRPr lang="de-DE"/>
           </a:p>
@@ -1412,7 +1413,7 @@
           <a:p>
             <a:fld id="{CAD28D52-5B67-8840-9FB3-766E3199C55A}" type="datetimeFigureOut">
               <a:rPr lang="de-DE" smtClean="0"/>
-              <a:t>21.03.16</a:t>
+              <a:t>22.03.16</a:t>
             </a:fld>
             <a:endParaRPr lang="de-DE"/>
           </a:p>
@@ -1779,7 +1780,7 @@
           <a:p>
             <a:fld id="{CAD28D52-5B67-8840-9FB3-766E3199C55A}" type="datetimeFigureOut">
               <a:rPr lang="de-DE" smtClean="0"/>
-              <a:t>21.03.16</a:t>
+              <a:t>22.03.16</a:t>
             </a:fld>
             <a:endParaRPr lang="de-DE"/>
           </a:p>
@@ -1897,7 +1898,7 @@
           <a:p>
             <a:fld id="{CAD28D52-5B67-8840-9FB3-766E3199C55A}" type="datetimeFigureOut">
               <a:rPr lang="de-DE" smtClean="0"/>
-              <a:t>21.03.16</a:t>
+              <a:t>22.03.16</a:t>
             </a:fld>
             <a:endParaRPr lang="de-DE"/>
           </a:p>
@@ -1992,7 +1993,7 @@
           <a:p>
             <a:fld id="{CAD28D52-5B67-8840-9FB3-766E3199C55A}" type="datetimeFigureOut">
               <a:rPr lang="de-DE" smtClean="0"/>
-              <a:t>21.03.16</a:t>
+              <a:t>22.03.16</a:t>
             </a:fld>
             <a:endParaRPr lang="de-DE"/>
           </a:p>
@@ -2269,7 +2270,7 @@
           <a:p>
             <a:fld id="{CAD28D52-5B67-8840-9FB3-766E3199C55A}" type="datetimeFigureOut">
               <a:rPr lang="de-DE" smtClean="0"/>
-              <a:t>21.03.16</a:t>
+              <a:t>22.03.16</a:t>
             </a:fld>
             <a:endParaRPr lang="de-DE"/>
           </a:p>
@@ -2522,7 +2523,7 @@
           <a:p>
             <a:fld id="{CAD28D52-5B67-8840-9FB3-766E3199C55A}" type="datetimeFigureOut">
               <a:rPr lang="de-DE" smtClean="0"/>
-              <a:t>21.03.16</a:t>
+              <a:t>22.03.16</a:t>
             </a:fld>
             <a:endParaRPr lang="de-DE"/>
           </a:p>
@@ -2735,7 +2736,7 @@
           <a:p>
             <a:fld id="{CAD28D52-5B67-8840-9FB3-766E3199C55A}" type="datetimeFigureOut">
               <a:rPr lang="de-DE" smtClean="0"/>
-              <a:t>21.03.16</a:t>
+              <a:t>22.03.16</a:t>
             </a:fld>
             <a:endParaRPr lang="de-DE"/>
           </a:p>
@@ -3151,7 +3152,7 @@
         <p:spPr>
           <a:xfrm>
             <a:off x="1255363" y="-1"/>
-            <a:ext cx="9000000" cy="6364286"/>
+            <a:ext cx="9000000" cy="3471864"/>
           </a:xfrm>
           <a:prstGeom prst="rect">
             <a:avLst/>
@@ -3188,23 +3189,101 @@
           </a:p>
         </p:txBody>
       </p:sp>
-      <p:sp>
-        <p:nvSpPr>
-          <p:cNvPr id="12" name="Rechteck 11"/>
-          <p:cNvSpPr/>
+      <p:pic>
+        <p:nvPicPr>
+          <p:cNvPr id="2" name="Bild 1"/>
+          <p:cNvPicPr>
+            <a:picLocks noChangeAspect="1"/>
+          </p:cNvPicPr>
           <p:nvPr/>
-        </p:nvSpPr>
+        </p:nvPicPr>
+        <p:blipFill>
+          <a:blip r:embed="rId2"/>
+          <a:stretch>
+            <a:fillRect/>
+          </a:stretch>
+        </p:blipFill>
         <p:spPr>
           <a:xfrm>
-            <a:off x="1435363" y="5334000"/>
-            <a:ext cx="8640000" cy="828000"/>
+            <a:off x="2239689" y="71436"/>
+            <a:ext cx="7031349" cy="3290887"/>
           </a:xfrm>
           <a:prstGeom prst="rect">
             <a:avLst/>
           </a:prstGeom>
-          <a:solidFill>
-            <a:schemeClr val="bg1"/>
-          </a:solidFill>
+        </p:spPr>
+      </p:pic>
+      <p:pic>
+        <p:nvPicPr>
+          <p:cNvPr id="5" name="Bild 4"/>
+          <p:cNvPicPr>
+            <a:picLocks noChangeAspect="1"/>
+          </p:cNvPicPr>
+          <p:nvPr/>
+        </p:nvPicPr>
+        <p:blipFill>
+          <a:blip r:embed="rId3"/>
+          <a:stretch>
+            <a:fillRect/>
+          </a:stretch>
+        </p:blipFill>
+        <p:spPr>
+          <a:xfrm>
+            <a:off x="1587500" y="1689100"/>
+            <a:ext cx="9017000" cy="3479800"/>
+          </a:xfrm>
+          <a:prstGeom prst="rect">
+            <a:avLst/>
+          </a:prstGeom>
+        </p:spPr>
+      </p:pic>
+    </p:spTree>
+    <p:extLst>
+      <p:ext uri="{BB962C8B-B14F-4D97-AF65-F5344CB8AC3E}">
+        <p14:creationId xmlns:p14="http://schemas.microsoft.com/office/powerpoint/2010/main" val="1195297916"/>
+      </p:ext>
+    </p:extLst>
+  </p:cSld>
+  <p:clrMapOvr>
+    <a:masterClrMapping/>
+  </p:clrMapOvr>
+</p:sld>
+</file>
+
+<file path=ppt/slides/slide2.xml><?xml version="1.0" encoding="utf-8"?>
+<p:sld xmlns:a="http://schemas.openxmlformats.org/drawingml/2006/main" xmlns:r="http://schemas.openxmlformats.org/officeDocument/2006/relationships" xmlns:p="http://schemas.openxmlformats.org/presentationml/2006/main">
+  <p:cSld>
+    <p:spTree>
+      <p:nvGrpSpPr>
+        <p:cNvPr id="1" name=""/>
+        <p:cNvGrpSpPr/>
+        <p:nvPr/>
+      </p:nvGrpSpPr>
+      <p:grpSpPr>
+        <a:xfrm>
+          <a:off x="0" y="0"/>
+          <a:ext cx="0" cy="0"/>
+          <a:chOff x="0" y="0"/>
+          <a:chExt cx="0" cy="0"/>
+        </a:xfrm>
+      </p:grpSpPr>
+      <p:sp>
+        <p:nvSpPr>
+          <p:cNvPr id="4" name="Rechteck 3"/>
+          <p:cNvSpPr>
+            <a:spLocks noChangeAspect="1"/>
+          </p:cNvSpPr>
+          <p:nvPr/>
+        </p:nvSpPr>
+        <p:spPr>
+          <a:xfrm>
+            <a:off x="1255363" y="-1"/>
+            <a:ext cx="9000000" cy="1714501"/>
+          </a:xfrm>
+          <a:prstGeom prst="rect">
+            <a:avLst/>
+          </a:prstGeom>
+          <a:noFill/>
           <a:ln>
             <a:solidFill>
               <a:schemeClr val="tx1"/>
@@ -3238,7 +3317,7 @@
       </p:sp>
       <p:pic>
         <p:nvPicPr>
-          <p:cNvPr id="2" name="Bild 1"/>
+          <p:cNvPr id="3" name="Bild 2"/>
           <p:cNvPicPr>
             <a:picLocks noChangeAspect="1"/>
           </p:cNvPicPr>
@@ -3252,8 +3331,8 @@
         </p:blipFill>
         <p:spPr>
           <a:xfrm>
-            <a:off x="1861826" y="142876"/>
-            <a:ext cx="7031349" cy="3290887"/>
+            <a:off x="2809184" y="180974"/>
+            <a:ext cx="5835206" cy="1376363"/>
           </a:xfrm>
           <a:prstGeom prst="rect">
             <a:avLst/>
@@ -3262,7 +3341,7 @@
       </p:pic>
       <p:pic>
         <p:nvPicPr>
-          <p:cNvPr id="3" name="Bild 2"/>
+          <p:cNvPr id="5" name="Bild 4"/>
           <p:cNvPicPr>
             <a:picLocks noChangeAspect="1"/>
           </p:cNvPicPr>
@@ -3276,8 +3355,8 @@
         </p:blipFill>
         <p:spPr>
           <a:xfrm>
-            <a:off x="3482975" y="4024312"/>
-            <a:ext cx="5168900" cy="1219200"/>
+            <a:off x="1587500" y="2565400"/>
+            <a:ext cx="9017000" cy="1727200"/>
           </a:xfrm>
           <a:prstGeom prst="rect">
             <a:avLst/>
@@ -3287,7 +3366,7 @@
     </p:spTree>
     <p:extLst>
       <p:ext uri="{BB962C8B-B14F-4D97-AF65-F5344CB8AC3E}">
-        <p14:creationId xmlns:p14="http://schemas.microsoft.com/office/powerpoint/2010/main" val="1195297916"/>
+        <p14:creationId xmlns:p14="http://schemas.microsoft.com/office/powerpoint/2010/main" val="507005712"/>
       </p:ext>
     </p:extLst>
   </p:cSld>

</xml_diff>